<commit_message>
updating setechnique slides into more chunks and a few tweaks
</commit_message>
<xml_diff>
--- a/ClassMaterials/SETechniques/Slides/Part1-SETechniques-Intro.pptx
+++ b/ClassMaterials/SETechniques/Slides/Part1-SETechniques-Intro.pptx
@@ -302,7 +302,7 @@
           <a:p>
             <a:fld id="{A470E182-4433-B944-AF35-723DFC7F8728}" type="datetimeFigureOut">
               <a:rPr lang="en-US" smtClean="0"/>
-              <a:t>11/22/2022</a:t>
+              <a:t>12/4/2022</a:t>
             </a:fld>
             <a:endParaRPr lang="en-US"/>
           </a:p>
@@ -467,7 +467,7 @@
           <a:p>
             <a:fld id="{C12EF212-CCF8-3B4F-9C5F-A87F03513D57}" type="datetimeFigureOut">
               <a:rPr lang="en-US" smtClean="0"/>
-              <a:t>11/22/2022</a:t>
+              <a:t>12/4/2022</a:t>
             </a:fld>
             <a:endParaRPr lang="en-US"/>
           </a:p>
@@ -982,7 +982,7 @@
               <a:pPr>
                 <a:defRPr/>
               </a:pPr>
-              <a:t>Tuesday, November 22, 2022</a:t>
+              <a:t>Sunday, December 4, 2022</a:t>
             </a:fld>
             <a:endParaRPr lang="en-US"/>
           </a:p>
@@ -1175,7 +1175,7 @@
               <a:pPr>
                 <a:defRPr/>
               </a:pPr>
-              <a:t>Tuesday, November 22, 2022</a:t>
+              <a:t>Sunday, December 4, 2022</a:t>
             </a:fld>
             <a:endParaRPr lang="en-US">
               <a:solidFill>
@@ -1388,7 +1388,7 @@
               <a:pPr>
                 <a:defRPr/>
               </a:pPr>
-              <a:t>Tuesday, November 22, 2022</a:t>
+              <a:t>Sunday, December 4, 2022</a:t>
             </a:fld>
             <a:endParaRPr lang="en-US">
               <a:solidFill>
@@ -1591,7 +1591,7 @@
               <a:pPr>
                 <a:defRPr/>
               </a:pPr>
-              <a:t>Tuesday, November 22, 2022</a:t>
+              <a:t>Sunday, December 4, 2022</a:t>
             </a:fld>
             <a:endParaRPr lang="en-US">
               <a:solidFill>
@@ -1871,7 +1871,7 @@
               <a:pPr>
                 <a:defRPr/>
               </a:pPr>
-              <a:t>Tuesday, November 22, 2022</a:t>
+              <a:t>Sunday, December 4, 2022</a:t>
             </a:fld>
             <a:endParaRPr lang="en-US">
               <a:solidFill>
@@ -2135,7 +2135,7 @@
               <a:pPr>
                 <a:defRPr/>
               </a:pPr>
-              <a:t>Tuesday, November 22, 2022</a:t>
+              <a:t>Sunday, December 4, 2022</a:t>
             </a:fld>
             <a:endParaRPr lang="en-US">
               <a:solidFill>
@@ -2534,7 +2534,7 @@
               <a:pPr>
                 <a:defRPr/>
               </a:pPr>
-              <a:t>Tuesday, November 22, 2022</a:t>
+              <a:t>Sunday, December 4, 2022</a:t>
             </a:fld>
             <a:endParaRPr lang="en-US">
               <a:solidFill>
@@ -2686,7 +2686,7 @@
               <a:pPr>
                 <a:defRPr/>
               </a:pPr>
-              <a:t>Tuesday, November 22, 2022</a:t>
+              <a:t>Sunday, December 4, 2022</a:t>
             </a:fld>
             <a:endParaRPr lang="en-US">
               <a:solidFill>
@@ -2816,7 +2816,7 @@
               <a:pPr>
                 <a:defRPr/>
               </a:pPr>
-              <a:t>Tuesday, November 22, 2022</a:t>
+              <a:t>Sunday, December 4, 2022</a:t>
             </a:fld>
             <a:endParaRPr lang="en-US">
               <a:solidFill>
@@ -3126,7 +3126,7 @@
               <a:pPr>
                 <a:defRPr/>
               </a:pPr>
-              <a:t>Tuesday, November 22, 2022</a:t>
+              <a:t>Sunday, December 4, 2022</a:t>
             </a:fld>
             <a:endParaRPr lang="en-US">
               <a:solidFill>
@@ -3413,7 +3413,7 @@
               <a:pPr>
                 <a:defRPr/>
               </a:pPr>
-              <a:t>Tuesday, November 22, 2022</a:t>
+              <a:t>Sunday, December 4, 2022</a:t>
             </a:fld>
             <a:endParaRPr lang="en-US">
               <a:solidFill>
@@ -3673,7 +3673,7 @@
                 </a:spcAft>
                 <a:defRPr/>
               </a:pPr>
-              <a:t>Tuesday, November 22, 2022</a:t>
+              <a:t>Sunday, December 4, 2022</a:t>
             </a:fld>
             <a:endParaRPr lang="en-US">
               <a:solidFill>

</xml_diff>

<commit_message>
updates slides for SETechniques making the text analysis easier to show
</commit_message>
<xml_diff>
--- a/ClassMaterials/SETechniques/Slides/Part1-SETechniques-Intro.pptx
+++ b/ClassMaterials/SETechniques/Slides/Part1-SETechniques-Intro.pptx
@@ -302,7 +302,7 @@
           <a:p>
             <a:fld id="{A470E182-4433-B944-AF35-723DFC7F8728}" type="datetimeFigureOut">
               <a:rPr lang="en-US" smtClean="0"/>
-              <a:t>12/4/2022</a:t>
+              <a:t>12/5/2022</a:t>
             </a:fld>
             <a:endParaRPr lang="en-US"/>
           </a:p>
@@ -467,7 +467,7 @@
           <a:p>
             <a:fld id="{C12EF212-CCF8-3B4F-9C5F-A87F03513D57}" type="datetimeFigureOut">
               <a:rPr lang="en-US" smtClean="0"/>
-              <a:t>12/4/2022</a:t>
+              <a:t>12/5/2022</a:t>
             </a:fld>
             <a:endParaRPr lang="en-US"/>
           </a:p>
@@ -982,7 +982,7 @@
               <a:pPr>
                 <a:defRPr/>
               </a:pPr>
-              <a:t>Sunday, December 4, 2022</a:t>
+              <a:t>Monday, December 5, 2022</a:t>
             </a:fld>
             <a:endParaRPr lang="en-US"/>
           </a:p>
@@ -1175,7 +1175,7 @@
               <a:pPr>
                 <a:defRPr/>
               </a:pPr>
-              <a:t>Sunday, December 4, 2022</a:t>
+              <a:t>Monday, December 5, 2022</a:t>
             </a:fld>
             <a:endParaRPr lang="en-US">
               <a:solidFill>
@@ -1388,7 +1388,7 @@
               <a:pPr>
                 <a:defRPr/>
               </a:pPr>
-              <a:t>Sunday, December 4, 2022</a:t>
+              <a:t>Monday, December 5, 2022</a:t>
             </a:fld>
             <a:endParaRPr lang="en-US">
               <a:solidFill>
@@ -1591,7 +1591,7 @@
               <a:pPr>
                 <a:defRPr/>
               </a:pPr>
-              <a:t>Sunday, December 4, 2022</a:t>
+              <a:t>Monday, December 5, 2022</a:t>
             </a:fld>
             <a:endParaRPr lang="en-US">
               <a:solidFill>
@@ -1871,7 +1871,7 @@
               <a:pPr>
                 <a:defRPr/>
               </a:pPr>
-              <a:t>Sunday, December 4, 2022</a:t>
+              <a:t>Monday, December 5, 2022</a:t>
             </a:fld>
             <a:endParaRPr lang="en-US">
               <a:solidFill>
@@ -2135,7 +2135,7 @@
               <a:pPr>
                 <a:defRPr/>
               </a:pPr>
-              <a:t>Sunday, December 4, 2022</a:t>
+              <a:t>Monday, December 5, 2022</a:t>
             </a:fld>
             <a:endParaRPr lang="en-US">
               <a:solidFill>
@@ -2534,7 +2534,7 @@
               <a:pPr>
                 <a:defRPr/>
               </a:pPr>
-              <a:t>Sunday, December 4, 2022</a:t>
+              <a:t>Monday, December 5, 2022</a:t>
             </a:fld>
             <a:endParaRPr lang="en-US">
               <a:solidFill>
@@ -2686,7 +2686,7 @@
               <a:pPr>
                 <a:defRPr/>
               </a:pPr>
-              <a:t>Sunday, December 4, 2022</a:t>
+              <a:t>Monday, December 5, 2022</a:t>
             </a:fld>
             <a:endParaRPr lang="en-US">
               <a:solidFill>
@@ -2816,7 +2816,7 @@
               <a:pPr>
                 <a:defRPr/>
               </a:pPr>
-              <a:t>Sunday, December 4, 2022</a:t>
+              <a:t>Monday, December 5, 2022</a:t>
             </a:fld>
             <a:endParaRPr lang="en-US">
               <a:solidFill>
@@ -3126,7 +3126,7 @@
               <a:pPr>
                 <a:defRPr/>
               </a:pPr>
-              <a:t>Sunday, December 4, 2022</a:t>
+              <a:t>Monday, December 5, 2022</a:t>
             </a:fld>
             <a:endParaRPr lang="en-US">
               <a:solidFill>
@@ -3413,7 +3413,7 @@
               <a:pPr>
                 <a:defRPr/>
               </a:pPr>
-              <a:t>Sunday, December 4, 2022</a:t>
+              <a:t>Monday, December 5, 2022</a:t>
             </a:fld>
             <a:endParaRPr lang="en-US">
               <a:solidFill>
@@ -3673,7 +3673,7 @@
                 </a:spcAft>
                 <a:defRPr/>
               </a:pPr>
-              <a:t>Sunday, December 4, 2022</a:t>
+              <a:t>Monday, December 5, 2022</a:t>
             </a:fld>
             <a:endParaRPr lang="en-US">
               <a:solidFill>
@@ -5999,21 +5999,6 @@
 </file>
 
 <file path=customXml/item1.xml><?xml version="1.0" encoding="utf-8"?>
-<p:properties xmlns:p="http://schemas.microsoft.com/office/2006/metadata/properties" xmlns:xsi="http://www.w3.org/2001/XMLSchema-instance" xmlns:pc="http://schemas.microsoft.com/office/infopath/2007/PartnerControls">
-  <documentManagement/>
-</p:properties>
-</file>
-
-<file path=customXml/item2.xml><?xml version="1.0" encoding="utf-8"?>
-<?mso-contentType ?>
-<FormTemplates xmlns="http://schemas.microsoft.com/sharepoint/v3/contenttype/forms">
-  <Display>DocumentLibraryForm</Display>
-  <Edit>DocumentLibraryForm</Edit>
-  <New>DocumentLibraryForm</New>
-</FormTemplates>
-</file>
-
-<file path=customXml/item3.xml><?xml version="1.0" encoding="utf-8"?>
 <ct:contentTypeSchema xmlns:ct="http://schemas.microsoft.com/office/2006/metadata/contentType" xmlns:ma="http://schemas.microsoft.com/office/2006/metadata/properties/metaAttributes" ct:_="" ma:_="" ma:contentTypeName="Document" ma:contentTypeID="0x0101004285D81DBE5F5A448E892B34D6B8CF20" ma:contentTypeVersion="2" ma:contentTypeDescription="Create a new document." ma:contentTypeScope="" ma:versionID="026ccaf10de5d9915dfa48c6db16b59b">
   <xsd:schema xmlns:xsd="http://www.w3.org/2001/XMLSchema" xmlns:xs="http://www.w3.org/2001/XMLSchema" xmlns:p="http://schemas.microsoft.com/office/2006/metadata/properties" xmlns:ns2="08600313-7276-4ca7-b5d3-7d86193ee0ac" targetNamespace="http://schemas.microsoft.com/office/2006/metadata/properties" ma:root="true" ma:fieldsID="c887e4ee215f388544e22a2030d7ea35" ns2:_="">
     <xsd:import namespace="08600313-7276-4ca7-b5d3-7d86193ee0ac"/>
@@ -6145,31 +6130,22 @@
 </ct:contentTypeSchema>
 </file>
 
-<file path=customXml/itemProps1.xml><?xml version="1.0" encoding="utf-8"?>
-<ds:datastoreItem xmlns:ds="http://schemas.openxmlformats.org/officeDocument/2006/customXml" ds:itemID="{0B642D87-A87A-4599-A6E2-B9CD1C09F0FA}">
-  <ds:schemaRefs>
-    <ds:schemaRef ds:uri="http://purl.org/dc/terms/"/>
-    <ds:schemaRef ds:uri="http://schemas.microsoft.com/office/2006/metadata/properties"/>
-    <ds:schemaRef ds:uri="http://schemas.openxmlformats.org/package/2006/metadata/core-properties"/>
-    <ds:schemaRef ds:uri="http://purl.org/dc/dcmitype/"/>
-    <ds:schemaRef ds:uri="http://purl.org/dc/elements/1.1/"/>
-    <ds:schemaRef ds:uri="http://schemas.microsoft.com/office/infopath/2007/PartnerControls"/>
-    <ds:schemaRef ds:uri="http://www.w3.org/XML/1998/namespace"/>
-    <ds:schemaRef ds:uri="79ddb764-415a-4c38-83b7-908be6382bea"/>
-    <ds:schemaRef ds:uri="http://schemas.microsoft.com/office/2006/documentManagement/types"/>
-  </ds:schemaRefs>
-</ds:datastoreItem>
+<file path=customXml/item2.xml><?xml version="1.0" encoding="utf-8"?>
+<?mso-contentType ?>
+<FormTemplates xmlns="http://schemas.microsoft.com/sharepoint/v3/contenttype/forms">
+  <Display>DocumentLibraryForm</Display>
+  <Edit>DocumentLibraryForm</Edit>
+  <New>DocumentLibraryForm</New>
+</FormTemplates>
 </file>
 
-<file path=customXml/itemProps2.xml><?xml version="1.0" encoding="utf-8"?>
-<ds:datastoreItem xmlns:ds="http://schemas.openxmlformats.org/officeDocument/2006/customXml" ds:itemID="{41D8B4DC-B6A1-4423-9A40-D80850572599}">
-  <ds:schemaRefs>
-    <ds:schemaRef ds:uri="http://schemas.microsoft.com/sharepoint/v3/contenttype/forms"/>
-  </ds:schemaRefs>
-</ds:datastoreItem>
+<file path=customXml/item3.xml><?xml version="1.0" encoding="utf-8"?>
+<p:properties xmlns:p="http://schemas.microsoft.com/office/2006/metadata/properties" xmlns:xsi="http://www.w3.org/2001/XMLSchema-instance" xmlns:pc="http://schemas.microsoft.com/office/infopath/2007/PartnerControls">
+  <documentManagement/>
+</p:properties>
 </file>
 
-<file path=customXml/itemProps3.xml><?xml version="1.0" encoding="utf-8"?>
+<file path=customXml/itemProps1.xml><?xml version="1.0" encoding="utf-8"?>
 <ds:datastoreItem xmlns:ds="http://schemas.openxmlformats.org/officeDocument/2006/customXml" ds:itemID="{33DBEA94-FCF4-49BF-A3E9-3226927C886C}">
   <ds:schemaRefs>
     <ds:schemaRef ds:uri="http://schemas.microsoft.com/office/2006/metadata/contentType"/>
@@ -6185,4 +6161,28 @@
     <ds:schemaRef ds:uri="http://schemas.microsoft.com/internal/obd"/>
   </ds:schemaRefs>
 </ds:datastoreItem>
+</file>
+
+<file path=customXml/itemProps2.xml><?xml version="1.0" encoding="utf-8"?>
+<ds:datastoreItem xmlns:ds="http://schemas.openxmlformats.org/officeDocument/2006/customXml" ds:itemID="{41D8B4DC-B6A1-4423-9A40-D80850572599}">
+  <ds:schemaRefs>
+    <ds:schemaRef ds:uri="http://schemas.microsoft.com/sharepoint/v3/contenttype/forms"/>
+  </ds:schemaRefs>
+</ds:datastoreItem>
+</file>
+
+<file path=customXml/itemProps3.xml><?xml version="1.0" encoding="utf-8"?>
+<ds:datastoreItem xmlns:ds="http://schemas.openxmlformats.org/officeDocument/2006/customXml" ds:itemID="{0B642D87-A87A-4599-A6E2-B9CD1C09F0FA}">
+  <ds:schemaRefs>
+    <ds:schemaRef ds:uri="http://purl.org/dc/terms/"/>
+    <ds:schemaRef ds:uri="http://schemas.microsoft.com/office/2006/metadata/properties"/>
+    <ds:schemaRef ds:uri="http://schemas.openxmlformats.org/package/2006/metadata/core-properties"/>
+    <ds:schemaRef ds:uri="http://purl.org/dc/dcmitype/"/>
+    <ds:schemaRef ds:uri="http://purl.org/dc/elements/1.1/"/>
+    <ds:schemaRef ds:uri="http://schemas.microsoft.com/office/infopath/2007/PartnerControls"/>
+    <ds:schemaRef ds:uri="http://www.w3.org/XML/1998/namespace"/>
+    <ds:schemaRef ds:uri="79ddb764-415a-4c38-83b7-908be6382bea"/>
+    <ds:schemaRef ds:uri="http://schemas.microsoft.com/office/2006/documentManagement/types"/>
+  </ds:schemaRefs>
+</ds:datastoreItem>
 </file>
</xml_diff>

<commit_message>
adjusting SETechniques day and giving starter and solution code
</commit_message>
<xml_diff>
--- a/ClassMaterials/SETechniques/Slides/Part1-SETechniques-Intro.pptx
+++ b/ClassMaterials/SETechniques/Slides/Part1-SETechniques-Intro.pptx
@@ -146,16 +146,32 @@
 </p:cmAuthorLst>
 </file>
 
-<file path=ppt/revisionInfo.xml><?xml version="1.0" encoding="utf-8"?>
-<p1510:revInfo xmlns:a="http://schemas.openxmlformats.org/drawingml/2006/main" xmlns:r="http://schemas.openxmlformats.org/officeDocument/2006/relationships" xmlns:p1510="http://schemas.microsoft.com/office/powerpoint/2015/10/main">
-  <p1510:revLst>
-    <p1510:client id="{F1CF9C36-F4F8-1B4D-AD1D-058936833E34}" v="2" dt="2022-03-17T12:55:39.675"/>
-  </p1510:revLst>
-</p1510:revInfo>
-</file>
-
 <file path=ppt/changesInfos/changesInfo1.xml><?xml version="1.0" encoding="utf-8"?>
 <pc:chgInfo xmlns:a="http://schemas.openxmlformats.org/drawingml/2006/main" xmlns:r="http://schemas.openxmlformats.org/officeDocument/2006/relationships" xmlns:ac="http://schemas.microsoft.com/office/drawing/2013/main/command" xmlns:pc="http://schemas.microsoft.com/office/powerpoint/2013/main/command">
+  <pc:docChgLst>
+    <pc:chgData name="Yoder, Jason" userId="28f4d4d8-da04-4f86-b14d-a21675737bc5" providerId="ADAL" clId="{708E4BA2-1A16-4984-848B-7C9DF3B925DE}"/>
+    <pc:docChg chg="modSld">
+      <pc:chgData name="Yoder, Jason" userId="28f4d4d8-da04-4f86-b14d-a21675737bc5" providerId="ADAL" clId="{708E4BA2-1A16-4984-848B-7C9DF3B925DE}" dt="2023-11-21T15:48:35.559" v="31" actId="6549"/>
+      <pc:docMkLst>
+        <pc:docMk/>
+      </pc:docMkLst>
+      <pc:sldChg chg="modSp mod">
+        <pc:chgData name="Yoder, Jason" userId="28f4d4d8-da04-4f86-b14d-a21675737bc5" providerId="ADAL" clId="{708E4BA2-1A16-4984-848B-7C9DF3B925DE}" dt="2023-11-21T15:48:35.559" v="31" actId="6549"/>
+        <pc:sldMkLst>
+          <pc:docMk/>
+          <pc:sldMk cId="1553627413" sldId="303"/>
+        </pc:sldMkLst>
+        <pc:spChg chg="mod">
+          <ac:chgData name="Yoder, Jason" userId="28f4d4d8-da04-4f86-b14d-a21675737bc5" providerId="ADAL" clId="{708E4BA2-1A16-4984-848B-7C9DF3B925DE}" dt="2023-11-21T15:48:35.559" v="31" actId="6549"/>
+          <ac:spMkLst>
+            <pc:docMk/>
+            <pc:sldMk cId="1553627413" sldId="303"/>
+            <ac:spMk id="7" creationId="{8C278F77-3A87-5847-99C2-352DD6917346}"/>
+          </ac:spMkLst>
+        </pc:spChg>
+      </pc:sldChg>
+    </pc:docChg>
+  </pc:docChgLst>
   <pc:docChgLst>
     <pc:chgData name="Manthey, Logan" userId="S::manthelt@rose-hulman.edu::773bc5b9-9de0-46b3-a4de-e2e10dd6e0b0" providerId="AD" clId="Web-{15BF6D29-5962-4D3E-A17D-49361B4B4260}"/>
     <pc:docChg chg="modSld">
@@ -302,7 +318,7 @@
           <a:p>
             <a:fld id="{A470E182-4433-B944-AF35-723DFC7F8728}" type="datetimeFigureOut">
               <a:rPr lang="en-US" smtClean="0"/>
-              <a:t>12/5/2022</a:t>
+              <a:t>11/21/2023</a:t>
             </a:fld>
             <a:endParaRPr lang="en-US"/>
           </a:p>
@@ -467,7 +483,7 @@
           <a:p>
             <a:fld id="{C12EF212-CCF8-3B4F-9C5F-A87F03513D57}" type="datetimeFigureOut">
               <a:rPr lang="en-US" smtClean="0"/>
-              <a:t>12/5/2022</a:t>
+              <a:t>11/21/2023</a:t>
             </a:fld>
             <a:endParaRPr lang="en-US"/>
           </a:p>
@@ -982,7 +998,7 @@
               <a:pPr>
                 <a:defRPr/>
               </a:pPr>
-              <a:t>Monday, December 5, 2022</a:t>
+              <a:t>Tuesday, November 21, 2023</a:t>
             </a:fld>
             <a:endParaRPr lang="en-US"/>
           </a:p>
@@ -1175,7 +1191,7 @@
               <a:pPr>
                 <a:defRPr/>
               </a:pPr>
-              <a:t>Monday, December 5, 2022</a:t>
+              <a:t>Tuesday, November 21, 2023</a:t>
             </a:fld>
             <a:endParaRPr lang="en-US">
               <a:solidFill>
@@ -1388,7 +1404,7 @@
               <a:pPr>
                 <a:defRPr/>
               </a:pPr>
-              <a:t>Monday, December 5, 2022</a:t>
+              <a:t>Tuesday, November 21, 2023</a:t>
             </a:fld>
             <a:endParaRPr lang="en-US">
               <a:solidFill>
@@ -1591,7 +1607,7 @@
               <a:pPr>
                 <a:defRPr/>
               </a:pPr>
-              <a:t>Monday, December 5, 2022</a:t>
+              <a:t>Tuesday, November 21, 2023</a:t>
             </a:fld>
             <a:endParaRPr lang="en-US">
               <a:solidFill>
@@ -1871,7 +1887,7 @@
               <a:pPr>
                 <a:defRPr/>
               </a:pPr>
-              <a:t>Monday, December 5, 2022</a:t>
+              <a:t>Tuesday, November 21, 2023</a:t>
             </a:fld>
             <a:endParaRPr lang="en-US">
               <a:solidFill>
@@ -2135,7 +2151,7 @@
               <a:pPr>
                 <a:defRPr/>
               </a:pPr>
-              <a:t>Monday, December 5, 2022</a:t>
+              <a:t>Tuesday, November 21, 2023</a:t>
             </a:fld>
             <a:endParaRPr lang="en-US">
               <a:solidFill>
@@ -2534,7 +2550,7 @@
               <a:pPr>
                 <a:defRPr/>
               </a:pPr>
-              <a:t>Monday, December 5, 2022</a:t>
+              <a:t>Tuesday, November 21, 2023</a:t>
             </a:fld>
             <a:endParaRPr lang="en-US">
               <a:solidFill>
@@ -2686,7 +2702,7 @@
               <a:pPr>
                 <a:defRPr/>
               </a:pPr>
-              <a:t>Monday, December 5, 2022</a:t>
+              <a:t>Tuesday, November 21, 2023</a:t>
             </a:fld>
             <a:endParaRPr lang="en-US">
               <a:solidFill>
@@ -2816,7 +2832,7 @@
               <a:pPr>
                 <a:defRPr/>
               </a:pPr>
-              <a:t>Monday, December 5, 2022</a:t>
+              <a:t>Tuesday, November 21, 2023</a:t>
             </a:fld>
             <a:endParaRPr lang="en-US">
               <a:solidFill>
@@ -3126,7 +3142,7 @@
               <a:pPr>
                 <a:defRPr/>
               </a:pPr>
-              <a:t>Monday, December 5, 2022</a:t>
+              <a:t>Tuesday, November 21, 2023</a:t>
             </a:fld>
             <a:endParaRPr lang="en-US">
               <a:solidFill>
@@ -3413,7 +3429,7 @@
               <a:pPr>
                 <a:defRPr/>
               </a:pPr>
-              <a:t>Monday, December 5, 2022</a:t>
+              <a:t>Tuesday, November 21, 2023</a:t>
             </a:fld>
             <a:endParaRPr lang="en-US">
               <a:solidFill>
@@ -3673,7 +3689,7 @@
                 </a:spcAft>
                 <a:defRPr/>
               </a:pPr>
-              <a:t>Monday, December 5, 2022</a:t>
+              <a:t>Tuesday, November 21, 2023</a:t>
             </a:fld>
             <a:endParaRPr lang="en-US">
               <a:solidFill>
@@ -4198,8 +4214,8 @@
         </p:nvSpPr>
         <p:spPr>
           <a:xfrm>
-            <a:off x="304800" y="4918754"/>
-            <a:ext cx="8534400" cy="1565186"/>
+            <a:off x="304800" y="4529308"/>
+            <a:ext cx="8534400" cy="2020082"/>
           </a:xfrm>
           <a:prstGeom prst="rect">
             <a:avLst/>
@@ -4272,6 +4288,49 @@
             <a:r>
               <a:rPr lang="en-US" sz="2400" i="1" dirty="0" err="1"/>
               <a:t>PracticeFirstOODesignSolution</a:t>
+            </a:r>
+            <a:endParaRPr lang="en-US" sz="2400" i="1" dirty="0"/>
+          </a:p>
+          <a:p>
+            <a:r>
+              <a:rPr lang="en-US" sz="2400" dirty="0">
+                <a:solidFill>
+                  <a:srgbClr val="FFFFFF"/>
+                </a:solidFill>
+              </a:rPr>
+              <a:t>The </a:t>
+            </a:r>
+            <a:r>
+              <a:rPr lang="en-US" sz="2400" i="1" dirty="0">
+                <a:solidFill>
+                  <a:srgbClr val="FFFFFF"/>
+                </a:solidFill>
+              </a:rPr>
+              <a:t>Quiz</a:t>
+            </a:r>
+            <a:r>
+              <a:rPr lang="en-US" sz="2400" dirty="0">
+                <a:solidFill>
+                  <a:srgbClr val="FFFFFF"/>
+                </a:solidFill>
+              </a:rPr>
+              <a:t> for today is</a:t>
+            </a:r>
+            <a:endParaRPr lang="en-US" sz="2400" i="1" dirty="0">
+              <a:solidFill>
+                <a:srgbClr val="FFFFFF"/>
+              </a:solidFill>
+            </a:endParaRPr>
+          </a:p>
+          <a:p>
+            <a:pPr marL="298450" lvl="0"/>
+            <a:r>
+              <a:rPr lang="en-US" sz="2400" i="1" dirty="0" err="1">
+                <a:solidFill>
+                  <a:srgbClr val="FFFFFF"/>
+                </a:solidFill>
+              </a:rPr>
+              <a:t>SETechniquesQuiz</a:t>
             </a:r>
             <a:endParaRPr lang="en-US" sz="2400" i="1" dirty="0"/>
           </a:p>
@@ -5999,6 +6058,21 @@
 </file>
 
 <file path=customXml/item1.xml><?xml version="1.0" encoding="utf-8"?>
+<p:properties xmlns:p="http://schemas.microsoft.com/office/2006/metadata/properties" xmlns:xsi="http://www.w3.org/2001/XMLSchema-instance" xmlns:pc="http://schemas.microsoft.com/office/infopath/2007/PartnerControls">
+  <documentManagement/>
+</p:properties>
+</file>
+
+<file path=customXml/item2.xml><?xml version="1.0" encoding="utf-8"?>
+<?mso-contentType ?>
+<FormTemplates xmlns="http://schemas.microsoft.com/sharepoint/v3/contenttype/forms">
+  <Display>DocumentLibraryForm</Display>
+  <Edit>DocumentLibraryForm</Edit>
+  <New>DocumentLibraryForm</New>
+</FormTemplates>
+</file>
+
+<file path=customXml/item3.xml><?xml version="1.0" encoding="utf-8"?>
 <ct:contentTypeSchema xmlns:ct="http://schemas.microsoft.com/office/2006/metadata/contentType" xmlns:ma="http://schemas.microsoft.com/office/2006/metadata/properties/metaAttributes" ct:_="" ma:_="" ma:contentTypeName="Document" ma:contentTypeID="0x0101004285D81DBE5F5A448E892B34D6B8CF20" ma:contentTypeVersion="2" ma:contentTypeDescription="Create a new document." ma:contentTypeScope="" ma:versionID="026ccaf10de5d9915dfa48c6db16b59b">
   <xsd:schema xmlns:xsd="http://www.w3.org/2001/XMLSchema" xmlns:xs="http://www.w3.org/2001/XMLSchema" xmlns:p="http://schemas.microsoft.com/office/2006/metadata/properties" xmlns:ns2="08600313-7276-4ca7-b5d3-7d86193ee0ac" targetNamespace="http://schemas.microsoft.com/office/2006/metadata/properties" ma:root="true" ma:fieldsID="c887e4ee215f388544e22a2030d7ea35" ns2:_="">
     <xsd:import namespace="08600313-7276-4ca7-b5d3-7d86193ee0ac"/>
@@ -6130,22 +6204,31 @@
 </ct:contentTypeSchema>
 </file>
 
-<file path=customXml/item2.xml><?xml version="1.0" encoding="utf-8"?>
-<?mso-contentType ?>
-<FormTemplates xmlns="http://schemas.microsoft.com/sharepoint/v3/contenttype/forms">
-  <Display>DocumentLibraryForm</Display>
-  <Edit>DocumentLibraryForm</Edit>
-  <New>DocumentLibraryForm</New>
-</FormTemplates>
+<file path=customXml/itemProps1.xml><?xml version="1.0" encoding="utf-8"?>
+<ds:datastoreItem xmlns:ds="http://schemas.openxmlformats.org/officeDocument/2006/customXml" ds:itemID="{0B642D87-A87A-4599-A6E2-B9CD1C09F0FA}">
+  <ds:schemaRefs>
+    <ds:schemaRef ds:uri="http://purl.org/dc/terms/"/>
+    <ds:schemaRef ds:uri="http://schemas.microsoft.com/office/2006/metadata/properties"/>
+    <ds:schemaRef ds:uri="http://schemas.openxmlformats.org/package/2006/metadata/core-properties"/>
+    <ds:schemaRef ds:uri="http://purl.org/dc/dcmitype/"/>
+    <ds:schemaRef ds:uri="http://purl.org/dc/elements/1.1/"/>
+    <ds:schemaRef ds:uri="http://schemas.microsoft.com/office/infopath/2007/PartnerControls"/>
+    <ds:schemaRef ds:uri="http://www.w3.org/XML/1998/namespace"/>
+    <ds:schemaRef ds:uri="79ddb764-415a-4c38-83b7-908be6382bea"/>
+    <ds:schemaRef ds:uri="http://schemas.microsoft.com/office/2006/documentManagement/types"/>
+  </ds:schemaRefs>
+</ds:datastoreItem>
 </file>
 
-<file path=customXml/item3.xml><?xml version="1.0" encoding="utf-8"?>
-<p:properties xmlns:p="http://schemas.microsoft.com/office/2006/metadata/properties" xmlns:xsi="http://www.w3.org/2001/XMLSchema-instance" xmlns:pc="http://schemas.microsoft.com/office/infopath/2007/PartnerControls">
-  <documentManagement/>
-</p:properties>
+<file path=customXml/itemProps2.xml><?xml version="1.0" encoding="utf-8"?>
+<ds:datastoreItem xmlns:ds="http://schemas.openxmlformats.org/officeDocument/2006/customXml" ds:itemID="{41D8B4DC-B6A1-4423-9A40-D80850572599}">
+  <ds:schemaRefs>
+    <ds:schemaRef ds:uri="http://schemas.microsoft.com/sharepoint/v3/contenttype/forms"/>
+  </ds:schemaRefs>
+</ds:datastoreItem>
 </file>
 
-<file path=customXml/itemProps1.xml><?xml version="1.0" encoding="utf-8"?>
+<file path=customXml/itemProps3.xml><?xml version="1.0" encoding="utf-8"?>
 <ds:datastoreItem xmlns:ds="http://schemas.openxmlformats.org/officeDocument/2006/customXml" ds:itemID="{33DBEA94-FCF4-49BF-A3E9-3226927C886C}">
   <ds:schemaRefs>
     <ds:schemaRef ds:uri="http://schemas.microsoft.com/office/2006/metadata/contentType"/>
@@ -6161,28 +6244,4 @@
     <ds:schemaRef ds:uri="http://schemas.microsoft.com/internal/obd"/>
   </ds:schemaRefs>
 </ds:datastoreItem>
-</file>
-
-<file path=customXml/itemProps2.xml><?xml version="1.0" encoding="utf-8"?>
-<ds:datastoreItem xmlns:ds="http://schemas.openxmlformats.org/officeDocument/2006/customXml" ds:itemID="{41D8B4DC-B6A1-4423-9A40-D80850572599}">
-  <ds:schemaRefs>
-    <ds:schemaRef ds:uri="http://schemas.microsoft.com/sharepoint/v3/contenttype/forms"/>
-  </ds:schemaRefs>
-</ds:datastoreItem>
-</file>
-
-<file path=customXml/itemProps3.xml><?xml version="1.0" encoding="utf-8"?>
-<ds:datastoreItem xmlns:ds="http://schemas.openxmlformats.org/officeDocument/2006/customXml" ds:itemID="{0B642D87-A87A-4599-A6E2-B9CD1C09F0FA}">
-  <ds:schemaRefs>
-    <ds:schemaRef ds:uri="http://purl.org/dc/terms/"/>
-    <ds:schemaRef ds:uri="http://schemas.microsoft.com/office/2006/metadata/properties"/>
-    <ds:schemaRef ds:uri="http://schemas.openxmlformats.org/package/2006/metadata/core-properties"/>
-    <ds:schemaRef ds:uri="http://purl.org/dc/dcmitype/"/>
-    <ds:schemaRef ds:uri="http://purl.org/dc/elements/1.1/"/>
-    <ds:schemaRef ds:uri="http://schemas.microsoft.com/office/infopath/2007/PartnerControls"/>
-    <ds:schemaRef ds:uri="http://www.w3.org/XML/1998/namespace"/>
-    <ds:schemaRef ds:uri="79ddb764-415a-4c38-83b7-908be6382bea"/>
-    <ds:schemaRef ds:uri="http://schemas.microsoft.com/office/2006/documentManagement/types"/>
-  </ds:schemaRefs>
-</ds:datastoreItem>
 </file>
</xml_diff>